<commit_message>
Started working on DC Chopper theory page
</commit_message>
<xml_diff>
--- a/Assets/Powerpoints/semiConverter.pptx
+++ b/Assets/Powerpoints/semiConverter.pptx
@@ -263,7 +263,7 @@
           <a:p>
             <a:fld id="{9C40E5B9-CC53-47D4-9D08-330AD4D6CC12}" type="datetimeFigureOut">
               <a:rPr lang="en-IN" smtClean="0"/>
-              <a:t>01-11-2022</a:t>
+              <a:t>08-12-2022</a:t>
             </a:fld>
             <a:endParaRPr lang="en-IN"/>
           </a:p>
@@ -463,7 +463,7 @@
           <a:p>
             <a:fld id="{9C40E5B9-CC53-47D4-9D08-330AD4D6CC12}" type="datetimeFigureOut">
               <a:rPr lang="en-IN" smtClean="0"/>
-              <a:t>01-11-2022</a:t>
+              <a:t>08-12-2022</a:t>
             </a:fld>
             <a:endParaRPr lang="en-IN"/>
           </a:p>
@@ -673,7 +673,7 @@
           <a:p>
             <a:fld id="{9C40E5B9-CC53-47D4-9D08-330AD4D6CC12}" type="datetimeFigureOut">
               <a:rPr lang="en-IN" smtClean="0"/>
-              <a:t>01-11-2022</a:t>
+              <a:t>08-12-2022</a:t>
             </a:fld>
             <a:endParaRPr lang="en-IN"/>
           </a:p>
@@ -873,7 +873,7 @@
           <a:p>
             <a:fld id="{9C40E5B9-CC53-47D4-9D08-330AD4D6CC12}" type="datetimeFigureOut">
               <a:rPr lang="en-IN" smtClean="0"/>
-              <a:t>01-11-2022</a:t>
+              <a:t>08-12-2022</a:t>
             </a:fld>
             <a:endParaRPr lang="en-IN"/>
           </a:p>
@@ -1149,7 +1149,7 @@
           <a:p>
             <a:fld id="{9C40E5B9-CC53-47D4-9D08-330AD4D6CC12}" type="datetimeFigureOut">
               <a:rPr lang="en-IN" smtClean="0"/>
-              <a:t>01-11-2022</a:t>
+              <a:t>08-12-2022</a:t>
             </a:fld>
             <a:endParaRPr lang="en-IN"/>
           </a:p>
@@ -1417,7 +1417,7 @@
           <a:p>
             <a:fld id="{9C40E5B9-CC53-47D4-9D08-330AD4D6CC12}" type="datetimeFigureOut">
               <a:rPr lang="en-IN" smtClean="0"/>
-              <a:t>01-11-2022</a:t>
+              <a:t>08-12-2022</a:t>
             </a:fld>
             <a:endParaRPr lang="en-IN"/>
           </a:p>
@@ -1832,7 +1832,7 @@
           <a:p>
             <a:fld id="{9C40E5B9-CC53-47D4-9D08-330AD4D6CC12}" type="datetimeFigureOut">
               <a:rPr lang="en-IN" smtClean="0"/>
-              <a:t>01-11-2022</a:t>
+              <a:t>08-12-2022</a:t>
             </a:fld>
             <a:endParaRPr lang="en-IN"/>
           </a:p>
@@ -1974,7 +1974,7 @@
           <a:p>
             <a:fld id="{9C40E5B9-CC53-47D4-9D08-330AD4D6CC12}" type="datetimeFigureOut">
               <a:rPr lang="en-IN" smtClean="0"/>
-              <a:t>01-11-2022</a:t>
+              <a:t>08-12-2022</a:t>
             </a:fld>
             <a:endParaRPr lang="en-IN"/>
           </a:p>
@@ -2087,7 +2087,7 @@
           <a:p>
             <a:fld id="{9C40E5B9-CC53-47D4-9D08-330AD4D6CC12}" type="datetimeFigureOut">
               <a:rPr lang="en-IN" smtClean="0"/>
-              <a:t>01-11-2022</a:t>
+              <a:t>08-12-2022</a:t>
             </a:fld>
             <a:endParaRPr lang="en-IN"/>
           </a:p>
@@ -2400,7 +2400,7 @@
           <a:p>
             <a:fld id="{9C40E5B9-CC53-47D4-9D08-330AD4D6CC12}" type="datetimeFigureOut">
               <a:rPr lang="en-IN" smtClean="0"/>
-              <a:t>01-11-2022</a:t>
+              <a:t>08-12-2022</a:t>
             </a:fld>
             <a:endParaRPr lang="en-IN"/>
           </a:p>
@@ -2689,7 +2689,7 @@
           <a:p>
             <a:fld id="{9C40E5B9-CC53-47D4-9D08-330AD4D6CC12}" type="datetimeFigureOut">
               <a:rPr lang="en-IN" smtClean="0"/>
-              <a:t>01-11-2022</a:t>
+              <a:t>08-12-2022</a:t>
             </a:fld>
             <a:endParaRPr lang="en-IN"/>
           </a:p>
@@ -2932,7 +2932,7 @@
           <a:p>
             <a:fld id="{9C40E5B9-CC53-47D4-9D08-330AD4D6CC12}" type="datetimeFigureOut">
               <a:rPr lang="en-IN" smtClean="0"/>
-              <a:t>01-11-2022</a:t>
+              <a:t>08-12-2022</a:t>
             </a:fld>
             <a:endParaRPr lang="en-IN"/>
           </a:p>

</xml_diff>